<commit_message>
feat: Poster different scaled image added
</commit_message>
<xml_diff>
--- a/poster.pptx
+++ b/poster.pptx
@@ -260,7 +260,7 @@
           <a:p>
             <a:fld id="{70905A53-D419-432F-BE56-EAB5F9641861}" type="datetimeFigureOut">
               <a:rPr lang="ko-KR" altLang="en-US" smtClean="0"/>
-              <a:t>2018-11-30 Fri</a:t>
+              <a:t>2018-12-03</a:t>
             </a:fld>
             <a:endParaRPr lang="ko-KR" altLang="en-US"/>
           </a:p>
@@ -790,7 +790,7 @@
           <a:p>
             <a:fld id="{0C88D129-7A47-450B-A8A4-237BA070E0DD}" type="datetimeFigureOut">
               <a:rPr lang="ko-KR" altLang="en-US" smtClean="0"/>
-              <a:t>2018-11-30 Fri</a:t>
+              <a:t>2018-12-03</a:t>
             </a:fld>
             <a:endParaRPr lang="ko-KR" altLang="en-US"/>
           </a:p>
@@ -958,7 +958,7 @@
           <a:p>
             <a:fld id="{0C88D129-7A47-450B-A8A4-237BA070E0DD}" type="datetimeFigureOut">
               <a:rPr lang="ko-KR" altLang="en-US" smtClean="0"/>
-              <a:t>2018-11-30 Fri</a:t>
+              <a:t>2018-12-03</a:t>
             </a:fld>
             <a:endParaRPr lang="ko-KR" altLang="en-US"/>
           </a:p>
@@ -1136,7 +1136,7 @@
           <a:p>
             <a:fld id="{0C88D129-7A47-450B-A8A4-237BA070E0DD}" type="datetimeFigureOut">
               <a:rPr lang="ko-KR" altLang="en-US" smtClean="0"/>
-              <a:t>2018-11-30 Fri</a:t>
+              <a:t>2018-12-03</a:t>
             </a:fld>
             <a:endParaRPr lang="ko-KR" altLang="en-US"/>
           </a:p>
@@ -1304,7 +1304,7 @@
           <a:p>
             <a:fld id="{0C88D129-7A47-450B-A8A4-237BA070E0DD}" type="datetimeFigureOut">
               <a:rPr lang="ko-KR" altLang="en-US" smtClean="0"/>
-              <a:t>2018-11-30 Fri</a:t>
+              <a:t>2018-12-03</a:t>
             </a:fld>
             <a:endParaRPr lang="ko-KR" altLang="en-US"/>
           </a:p>
@@ -1549,7 +1549,7 @@
           <a:p>
             <a:fld id="{0C88D129-7A47-450B-A8A4-237BA070E0DD}" type="datetimeFigureOut">
               <a:rPr lang="ko-KR" altLang="en-US" smtClean="0"/>
-              <a:t>2018-11-30 Fri</a:t>
+              <a:t>2018-12-03</a:t>
             </a:fld>
             <a:endParaRPr lang="ko-KR" altLang="en-US"/>
           </a:p>
@@ -1834,7 +1834,7 @@
           <a:p>
             <a:fld id="{0C88D129-7A47-450B-A8A4-237BA070E0DD}" type="datetimeFigureOut">
               <a:rPr lang="ko-KR" altLang="en-US" smtClean="0"/>
-              <a:t>2018-11-30 Fri</a:t>
+              <a:t>2018-12-03</a:t>
             </a:fld>
             <a:endParaRPr lang="ko-KR" altLang="en-US"/>
           </a:p>
@@ -2258,7 +2258,7 @@
           <a:p>
             <a:fld id="{0C88D129-7A47-450B-A8A4-237BA070E0DD}" type="datetimeFigureOut">
               <a:rPr lang="ko-KR" altLang="en-US" smtClean="0"/>
-              <a:t>2018-11-30 Fri</a:t>
+              <a:t>2018-12-03</a:t>
             </a:fld>
             <a:endParaRPr lang="ko-KR" altLang="en-US"/>
           </a:p>
@@ -2375,7 +2375,7 @@
           <a:p>
             <a:fld id="{0C88D129-7A47-450B-A8A4-237BA070E0DD}" type="datetimeFigureOut">
               <a:rPr lang="ko-KR" altLang="en-US" smtClean="0"/>
-              <a:t>2018-11-30 Fri</a:t>
+              <a:t>2018-12-03</a:t>
             </a:fld>
             <a:endParaRPr lang="ko-KR" altLang="en-US"/>
           </a:p>
@@ -2470,7 +2470,7 @@
           <a:p>
             <a:fld id="{0C88D129-7A47-450B-A8A4-237BA070E0DD}" type="datetimeFigureOut">
               <a:rPr lang="ko-KR" altLang="en-US" smtClean="0"/>
-              <a:t>2018-11-30 Fri</a:t>
+              <a:t>2018-12-03</a:t>
             </a:fld>
             <a:endParaRPr lang="ko-KR" altLang="en-US"/>
           </a:p>
@@ -2745,7 +2745,7 @@
           <a:p>
             <a:fld id="{0C88D129-7A47-450B-A8A4-237BA070E0DD}" type="datetimeFigureOut">
               <a:rPr lang="ko-KR" altLang="en-US" smtClean="0"/>
-              <a:t>2018-11-30 Fri</a:t>
+              <a:t>2018-12-03</a:t>
             </a:fld>
             <a:endParaRPr lang="ko-KR" altLang="en-US"/>
           </a:p>
@@ -2997,7 +2997,7 @@
           <a:p>
             <a:fld id="{0C88D129-7A47-450B-A8A4-237BA070E0DD}" type="datetimeFigureOut">
               <a:rPr lang="ko-KR" altLang="en-US" smtClean="0"/>
-              <a:t>2018-11-30 Fri</a:t>
+              <a:t>2018-12-03</a:t>
             </a:fld>
             <a:endParaRPr lang="ko-KR" altLang="en-US"/>
           </a:p>
@@ -3208,7 +3208,7 @@
           <a:p>
             <a:fld id="{0C88D129-7A47-450B-A8A4-237BA070E0DD}" type="datetimeFigureOut">
               <a:rPr lang="ko-KR" altLang="en-US" smtClean="0"/>
-              <a:t>2018-11-30 Fri</a:t>
+              <a:t>2018-12-03</a:t>
             </a:fld>
             <a:endParaRPr lang="ko-KR" altLang="en-US"/>
           </a:p>
@@ -27010,13 +27010,13 @@
               <a:t> </a:t>
             </a:r>
             <a:r>
-              <a:rPr lang="en-US" altLang="ko-KR" sz="6600" b="1" dirty="0" smtClean="0">
+              <a:rPr lang="en-US" altLang="ko-KR" sz="6600" b="1" dirty="0">
                 <a:latin typeface="+mn-ea"/>
               </a:rPr>
               <a:t>Panoramic Image </a:t>
             </a:r>
             <a:r>
-              <a:rPr lang="en-US" altLang="ko-KR" sz="6600" b="1" dirty="0" err="1" smtClean="0">
+              <a:rPr lang="en-US" altLang="ko-KR" sz="6600" b="1" dirty="0" err="1">
                 <a:latin typeface="+mn-ea"/>
               </a:rPr>
               <a:t>Stiching</a:t>
@@ -27035,8 +27035,8 @@
         </p:nvSpPr>
         <p:spPr>
           <a:xfrm>
-            <a:off x="1999908" y="3310130"/>
-            <a:ext cx="27856884" cy="738664"/>
+            <a:off x="2078277" y="2610263"/>
+            <a:ext cx="27856884" cy="1384995"/>
           </a:xfrm>
           <a:prstGeom prst="rect">
             <a:avLst/>
@@ -27051,20 +27051,35 @@
           <a:p>
             <a:pPr algn="ctr"/>
             <a:r>
-              <a:rPr lang="en-US" altLang="ko-KR" sz="4200" b="1" dirty="0" smtClean="0">
+              <a:rPr lang="en-US" altLang="ko-KR" sz="4200" b="1" dirty="0">
                 <a:latin typeface="+mn-ea"/>
               </a:rPr>
               <a:t>2013170995 </a:t>
             </a:r>
             <a:r>
-              <a:rPr lang="ko-KR" altLang="en-US" sz="4200" b="1" dirty="0" smtClean="0">
+              <a:rPr lang="ko-KR" altLang="en-US" sz="4200" b="1" dirty="0" err="1">
                 <a:latin typeface="+mn-ea"/>
               </a:rPr>
               <a:t>정우재</a:t>
             </a:r>
-            <a:endParaRPr lang="ko-KR" altLang="en-US" sz="4200" b="1" dirty="0">
+            <a:endParaRPr lang="en-US" altLang="ko-KR" sz="4200" b="1" dirty="0">
               <a:latin typeface="+mn-ea"/>
             </a:endParaRPr>
+          </a:p>
+          <a:p>
+            <a:pPr algn="ctr"/>
+            <a:r>
+              <a:rPr lang="en-US" altLang="ko-KR" sz="4200" b="1" dirty="0">
+                <a:latin typeface="+mn-ea"/>
+              </a:rPr>
+              <a:t>2013170993 </a:t>
+            </a:r>
+            <a:r>
+              <a:rPr lang="ko-KR" altLang="en-US" sz="4200" b="1" dirty="0">
+                <a:latin typeface="+mn-ea"/>
+              </a:rPr>
+              <a:t>곽민준</a:t>
+            </a:r>
           </a:p>
         </p:txBody>
       </p:sp>
@@ -27466,13 +27481,7 @@
               <a:rPr lang="ko-KR" altLang="en-US" sz="4200" b="1" dirty="0">
                 <a:latin typeface="+mn-ea"/>
               </a:rPr>
-              <a:t>고려대학교 공과대학 </a:t>
-            </a:r>
-            <a:r>
-              <a:rPr lang="ko-KR" altLang="en-US" sz="4200" b="1" dirty="0" smtClean="0">
-                <a:latin typeface="+mn-ea"/>
-              </a:rPr>
-              <a:t>전기전자전파공학과</a:t>
+              <a:t>고려대학교 공과대학 전기전자전파공학과</a:t>
             </a:r>
             <a:endParaRPr lang="en-US" altLang="ko-KR" sz="4200" b="1" dirty="0">
               <a:latin typeface="+mn-ea"/>
@@ -27617,18 +27626,18 @@
           <a:lstStyle/>
           <a:p>
             <a:r>
-              <a:rPr lang="ko-KR" altLang="en-US" sz="4000" b="1" dirty="0" smtClean="0">
+              <a:rPr lang="ko-KR" altLang="en-US" sz="4000" b="1" dirty="0">
                 <a:latin typeface="+mn-ea"/>
               </a:rPr>
               <a:t>정우재</a:t>
             </a:r>
-            <a:endParaRPr lang="en-US" altLang="ko-KR" sz="4000" b="1" dirty="0" smtClean="0">
+            <a:endParaRPr lang="en-US" altLang="ko-KR" sz="4000" b="1" dirty="0">
               <a:latin typeface="+mn-ea"/>
             </a:endParaRPr>
           </a:p>
           <a:p>
             <a:r>
-              <a:rPr lang="en-US" altLang="ko-KR" sz="4000" b="1" dirty="0" smtClean="0">
+              <a:rPr lang="en-US" altLang="ko-KR" sz="4000" b="1" dirty="0">
                 <a:latin typeface="+mn-ea"/>
               </a:rPr>
               <a:t>Panoramic Image Stitching</a:t>
@@ -27641,7 +27650,7 @@
           <p:cNvPr id="647" name="TextBox 646">
             <a:extLst>
               <a:ext uri="{FF2B5EF4-FFF2-40B4-BE49-F238E27FC236}">
-                <a16:creationId xmlns="" xmlns:a16="http://schemas.microsoft.com/office/drawing/2014/main" id="{1E3662EC-C681-4E26-B6E0-E29D25607847}"/>
+                <a16:creationId xmlns:a16="http://schemas.microsoft.com/office/drawing/2014/main" id="{1E3662EC-C681-4E26-B6E0-E29D25607847}"/>
               </a:ext>
             </a:extLst>
           </p:cNvPr>
@@ -27670,7 +27679,7 @@
               </a:lnSpc>
             </a:pPr>
             <a:r>
-              <a:rPr lang="en-US" altLang="ko-KR" sz="3400" dirty="0" smtClean="0">
+              <a:rPr lang="en-US" altLang="ko-KR" sz="3400" dirty="0">
                 <a:latin typeface="+mn-ea"/>
               </a:rPr>
               <a:t>1) Images Stitching with Different Illumination</a:t>
@@ -27686,7 +27695,7 @@
           <p:cNvPr id="667" name="TextBox 666">
             <a:extLst>
               <a:ext uri="{FF2B5EF4-FFF2-40B4-BE49-F238E27FC236}">
-                <a16:creationId xmlns="" xmlns:a16="http://schemas.microsoft.com/office/drawing/2014/main" id="{69DFC732-B33D-4019-9CAE-68C163276EC4}"/>
+                <a16:creationId xmlns:a16="http://schemas.microsoft.com/office/drawing/2014/main" id="{69DFC732-B33D-4019-9CAE-68C163276EC4}"/>
               </a:ext>
             </a:extLst>
           </p:cNvPr>
@@ -27711,7 +27720,7 @@
           <a:p>
             <a:pPr algn="ctr"/>
             <a:r>
-              <a:rPr lang="en-US" altLang="ko-KR" sz="2400" b="1" dirty="0" smtClean="0"/>
+              <a:rPr lang="en-US" altLang="ko-KR" sz="2400" b="1" dirty="0"/>
               <a:t>Fig1. Image Stitching with different illumination</a:t>
             </a:r>
             <a:endParaRPr lang="ko-KR" altLang="en-US" sz="2400" b="1" dirty="0"/>
@@ -27723,7 +27732,7 @@
           <p:cNvPr id="558" name="TextBox 557">
             <a:extLst>
               <a:ext uri="{FF2B5EF4-FFF2-40B4-BE49-F238E27FC236}">
-                <a16:creationId xmlns="" xmlns:a16="http://schemas.microsoft.com/office/drawing/2014/main" id="{0F929444-19AB-439E-871C-CDAB80130130}"/>
+                <a16:creationId xmlns:a16="http://schemas.microsoft.com/office/drawing/2014/main" id="{0F929444-19AB-439E-871C-CDAB80130130}"/>
               </a:ext>
             </a:extLst>
           </p:cNvPr>
@@ -27754,18 +27763,17 @@
               <a:buChar char="-"/>
             </a:pPr>
             <a:r>
-              <a:rPr lang="en-US" altLang="ko-KR" sz="2600" dirty="0" smtClean="0"/>
+              <a:rPr lang="en-US" altLang="ko-KR" sz="2600" dirty="0"/>
               <a:t>Blending</a:t>
             </a:r>
             <a:r>
-              <a:rPr lang="ko-KR" altLang="en-US" sz="2600" dirty="0" smtClean="0"/>
+              <a:rPr lang="ko-KR" altLang="en-US" sz="2600" dirty="0"/>
               <a:t>을 하는 각 영상의 영역에서 평균 조도를 구하고 차이를 보완한다</a:t>
             </a:r>
             <a:r>
-              <a:rPr lang="en-US" altLang="ko-KR" sz="2600" dirty="0" smtClean="0"/>
+              <a:rPr lang="en-US" altLang="ko-KR" sz="2600" dirty="0"/>
               <a:t>.</a:t>
             </a:r>
-            <a:endParaRPr lang="en-US" altLang="ko-KR" sz="2600" dirty="0"/>
           </a:p>
         </p:txBody>
       </p:sp>
@@ -27774,7 +27782,7 @@
           <p:cNvPr id="559" name="직선 연결선 558">
             <a:extLst>
               <a:ext uri="{FF2B5EF4-FFF2-40B4-BE49-F238E27FC236}">
-                <a16:creationId xmlns="" xmlns:a16="http://schemas.microsoft.com/office/drawing/2014/main" id="{FA9B1A7E-08A2-4E1D-AA80-2AFE3D1863B7}"/>
+                <a16:creationId xmlns:a16="http://schemas.microsoft.com/office/drawing/2014/main" id="{FA9B1A7E-08A2-4E1D-AA80-2AFE3D1863B7}"/>
               </a:ext>
             </a:extLst>
           </p:cNvPr>
@@ -27829,7 +27837,7 @@
           <p:cNvPr id="560" name="TextBox 559">
             <a:extLst>
               <a:ext uri="{FF2B5EF4-FFF2-40B4-BE49-F238E27FC236}">
-                <a16:creationId xmlns="" xmlns:a16="http://schemas.microsoft.com/office/drawing/2014/main" id="{01FBC5BD-4AA0-437C-8479-7E77A7D54F6F}"/>
+                <a16:creationId xmlns:a16="http://schemas.microsoft.com/office/drawing/2014/main" id="{01FBC5BD-4AA0-437C-8479-7E77A7D54F6F}"/>
               </a:ext>
             </a:extLst>
           </p:cNvPr>
@@ -27853,7 +27861,7 @@
           <a:lstStyle/>
           <a:p>
             <a:r>
-              <a:rPr lang="en-US" altLang="ko-KR" sz="4800" dirty="0" smtClean="0">
+              <a:rPr lang="en-US" altLang="ko-KR" sz="4800" dirty="0">
                 <a:latin typeface="+mn-ea"/>
               </a:rPr>
               <a:t>Image Stitching</a:t>
@@ -27869,7 +27877,7 @@
           <p:cNvPr id="565" name="TextBox 564">
             <a:extLst>
               <a:ext uri="{FF2B5EF4-FFF2-40B4-BE49-F238E27FC236}">
-                <a16:creationId xmlns="" xmlns:a16="http://schemas.microsoft.com/office/drawing/2014/main" id="{C5A343A7-4B2D-439D-8346-64150CA27378}"/>
+                <a16:creationId xmlns:a16="http://schemas.microsoft.com/office/drawing/2014/main" id="{C5A343A7-4B2D-439D-8346-64150CA27378}"/>
               </a:ext>
             </a:extLst>
           </p:cNvPr>
@@ -27900,18 +27908,18 @@
               <a:buChar char="-"/>
             </a:pPr>
             <a:r>
-              <a:rPr lang="ko-KR" altLang="en-US" sz="2600" dirty="0" smtClean="0"/>
+              <a:rPr lang="ko-KR" altLang="en-US" sz="2600" dirty="0"/>
               <a:t>동일한 배경에서 찍힌 두 영상을 하나의 파노라마 영상으로 자연스럽게 이어 붙이는 것을 목적으로 한다</a:t>
             </a:r>
             <a:r>
-              <a:rPr lang="en-US" altLang="ko-KR" sz="2600" dirty="0" smtClean="0"/>
+              <a:rPr lang="en-US" altLang="ko-KR" sz="2600" dirty="0"/>
               <a:t>.</a:t>
             </a:r>
             <a:r>
-              <a:rPr lang="ko-KR" altLang="en-US" sz="2600" dirty="0" smtClean="0"/>
+              <a:rPr lang="ko-KR" altLang="en-US" sz="2600" dirty="0"/>
               <a:t> </a:t>
             </a:r>
-            <a:endParaRPr lang="en-US" altLang="ko-KR" sz="2600" dirty="0" smtClean="0"/>
+            <a:endParaRPr lang="en-US" altLang="ko-KR" sz="2600" dirty="0"/>
           </a:p>
           <a:p>
             <a:pPr marL="457200" indent="-457200">
@@ -27922,66 +27930,65 @@
               <a:buChar char="-"/>
             </a:pPr>
             <a:r>
-              <a:rPr lang="en-US" altLang="ko-KR" sz="2600" dirty="0" smtClean="0"/>
+              <a:rPr lang="en-US" altLang="ko-KR" sz="2600" dirty="0"/>
               <a:t>Local Feature extraction </a:t>
             </a:r>
             <a:r>
-              <a:rPr lang="ko-KR" altLang="en-US" sz="2600" dirty="0" smtClean="0"/>
+              <a:rPr lang="ko-KR" altLang="en-US" sz="2600" dirty="0"/>
               <a:t>알고리즘을 이용해 서로 다른 두 영상의 </a:t>
             </a:r>
             <a:r>
-              <a:rPr lang="ko-KR" altLang="en-US" sz="2600" dirty="0" err="1" smtClean="0"/>
+              <a:rPr lang="ko-KR" altLang="en-US" sz="2600" dirty="0" err="1"/>
               <a:t>특징점들을</a:t>
             </a:r>
             <a:r>
-              <a:rPr lang="ko-KR" altLang="en-US" sz="2600" dirty="0" smtClean="0"/>
+              <a:rPr lang="ko-KR" altLang="en-US" sz="2600" dirty="0"/>
               <a:t> 뽑아내고 특징이 비슷한 점들을 </a:t>
             </a:r>
             <a:r>
-              <a:rPr lang="en-US" altLang="ko-KR" sz="2600" dirty="0" smtClean="0"/>
+              <a:rPr lang="en-US" altLang="ko-KR" sz="2600" dirty="0"/>
               <a:t>RANSAC </a:t>
             </a:r>
             <a:r>
-              <a:rPr lang="ko-KR" altLang="en-US" sz="2600" dirty="0" smtClean="0"/>
+              <a:rPr lang="ko-KR" altLang="en-US" sz="2600" dirty="0"/>
               <a:t>알고리즘을 이용해서 </a:t>
             </a:r>
             <a:r>
-              <a:rPr lang="en-US" altLang="ko-KR" sz="2600" dirty="0" err="1" smtClean="0"/>
+              <a:rPr lang="en-US" altLang="ko-KR" sz="2600" dirty="0" err="1"/>
               <a:t>Inliner</a:t>
             </a:r>
             <a:r>
-              <a:rPr lang="ko-KR" altLang="en-US" sz="2600" dirty="0" smtClean="0"/>
+              <a:rPr lang="ko-KR" altLang="en-US" sz="2600" dirty="0"/>
               <a:t>들을 </a:t>
             </a:r>
             <a:r>
-              <a:rPr lang="en-US" altLang="ko-KR" sz="2600" dirty="0" smtClean="0"/>
+              <a:rPr lang="en-US" altLang="ko-KR" sz="2600" dirty="0"/>
               <a:t>Matching</a:t>
             </a:r>
             <a:r>
-              <a:rPr lang="ko-KR" altLang="en-US" sz="2600" dirty="0" smtClean="0"/>
+              <a:rPr lang="ko-KR" altLang="en-US" sz="2600" dirty="0"/>
               <a:t>을 한 후 </a:t>
             </a:r>
             <a:r>
-              <a:rPr lang="en-US" altLang="ko-KR" sz="2600" dirty="0" smtClean="0"/>
+              <a:rPr lang="en-US" altLang="ko-KR" sz="2600" dirty="0"/>
               <a:t>Matching</a:t>
             </a:r>
             <a:r>
-              <a:rPr lang="ko-KR" altLang="en-US" sz="2600" dirty="0" smtClean="0"/>
+              <a:rPr lang="ko-KR" altLang="en-US" sz="2600" dirty="0"/>
               <a:t>의 </a:t>
             </a:r>
             <a:r>
-              <a:rPr lang="en-US" altLang="ko-KR" sz="2600" dirty="0" smtClean="0"/>
+              <a:rPr lang="en-US" altLang="ko-KR" sz="2600" dirty="0"/>
               <a:t>error</a:t>
             </a:r>
             <a:r>
-              <a:rPr lang="ko-KR" altLang="en-US" sz="2600" dirty="0" smtClean="0"/>
+              <a:rPr lang="ko-KR" altLang="en-US" sz="2600" dirty="0"/>
               <a:t>가 최소화 되는 영역에 대해 두 영상을 이어 붙인다</a:t>
             </a:r>
             <a:r>
-              <a:rPr lang="en-US" altLang="ko-KR" sz="2600" dirty="0" smtClean="0"/>
+              <a:rPr lang="en-US" altLang="ko-KR" sz="2600" dirty="0"/>
               <a:t>.</a:t>
             </a:r>
-            <a:endParaRPr lang="en-US" altLang="ko-KR" sz="2600" dirty="0"/>
           </a:p>
         </p:txBody>
       </p:sp>
@@ -27990,7 +27997,7 @@
           <p:cNvPr id="575" name="TextBox 574">
             <a:extLst>
               <a:ext uri="{FF2B5EF4-FFF2-40B4-BE49-F238E27FC236}">
-                <a16:creationId xmlns="" xmlns:a16="http://schemas.microsoft.com/office/drawing/2014/main" id="{6BB1D221-B8C0-4BAC-93F8-93BA30C98E23}"/>
+                <a16:creationId xmlns:a16="http://schemas.microsoft.com/office/drawing/2014/main" id="{6BB1D221-B8C0-4BAC-93F8-93BA30C98E23}"/>
               </a:ext>
             </a:extLst>
           </p:cNvPr>
@@ -28015,7 +28022,7 @@
           <a:p>
             <a:pPr algn="ctr"/>
             <a:r>
-              <a:rPr lang="en-US" altLang="ko-KR" sz="2400" b="1" dirty="0" smtClean="0"/>
+              <a:rPr lang="en-US" altLang="ko-KR" sz="2400" b="1" dirty="0"/>
               <a:t>Fig2. Panoramic Image </a:t>
             </a:r>
             <a:endParaRPr lang="ko-KR" altLang="en-US" sz="2400" b="1" dirty="0"/>
@@ -28123,7 +28130,7 @@
           <p:cNvPr id="578" name="TextBox 577">
             <a:extLst>
               <a:ext uri="{FF2B5EF4-FFF2-40B4-BE49-F238E27FC236}">
-                <a16:creationId xmlns="" xmlns:a16="http://schemas.microsoft.com/office/drawing/2014/main" id="{1E3662EC-C681-4E26-B6E0-E29D25607847}"/>
+                <a16:creationId xmlns:a16="http://schemas.microsoft.com/office/drawing/2014/main" id="{1E3662EC-C681-4E26-B6E0-E29D25607847}"/>
               </a:ext>
             </a:extLst>
           </p:cNvPr>
@@ -28152,7 +28159,7 @@
               </a:lnSpc>
             </a:pPr>
             <a:r>
-              <a:rPr lang="en-US" altLang="ko-KR" sz="3400" dirty="0" smtClean="0">
+              <a:rPr lang="en-US" altLang="ko-KR" sz="3400" dirty="0">
                 <a:latin typeface="+mn-ea"/>
               </a:rPr>
               <a:t>2) Multiple Images Stitching</a:t>
@@ -28168,7 +28175,7 @@
           <p:cNvPr id="580" name="TextBox 579">
             <a:extLst>
               <a:ext uri="{FF2B5EF4-FFF2-40B4-BE49-F238E27FC236}">
-                <a16:creationId xmlns="" xmlns:a16="http://schemas.microsoft.com/office/drawing/2014/main" id="{0F929444-19AB-439E-871C-CDAB80130130}"/>
+                <a16:creationId xmlns:a16="http://schemas.microsoft.com/office/drawing/2014/main" id="{0F929444-19AB-439E-871C-CDAB80130130}"/>
               </a:ext>
             </a:extLst>
           </p:cNvPr>
@@ -28199,30 +28206,29 @@
               <a:buChar char="-"/>
             </a:pPr>
             <a:r>
-              <a:rPr lang="ko-KR" altLang="en-US" sz="2600" dirty="0" smtClean="0"/>
+              <a:rPr lang="ko-KR" altLang="en-US" sz="2600" dirty="0"/>
               <a:t>여러 개의 영상들을 순서대로 </a:t>
             </a:r>
             <a:r>
-              <a:rPr lang="en-US" altLang="ko-KR" sz="2600" dirty="0" smtClean="0"/>
+              <a:rPr lang="en-US" altLang="ko-KR" sz="2600" dirty="0"/>
               <a:t>Image Stitching</a:t>
             </a:r>
             <a:r>
-              <a:rPr lang="ko-KR" altLang="en-US" sz="2600" dirty="0" smtClean="0"/>
+              <a:rPr lang="ko-KR" altLang="en-US" sz="2600" dirty="0"/>
               <a:t>을 해서 하나의 </a:t>
             </a:r>
             <a:r>
-              <a:rPr lang="en-US" altLang="ko-KR" sz="2600" dirty="0" smtClean="0"/>
+              <a:rPr lang="en-US" altLang="ko-KR" sz="2600" dirty="0"/>
               <a:t>panoramic Image</a:t>
             </a:r>
             <a:r>
-              <a:rPr lang="ko-KR" altLang="en-US" sz="2600" dirty="0" smtClean="0"/>
+              <a:rPr lang="ko-KR" altLang="en-US" sz="2600" dirty="0"/>
               <a:t>를 구현한다</a:t>
             </a:r>
             <a:r>
-              <a:rPr lang="en-US" altLang="ko-KR" sz="2600" dirty="0" smtClean="0"/>
+              <a:rPr lang="en-US" altLang="ko-KR" sz="2600" dirty="0"/>
               <a:t>.</a:t>
             </a:r>
-            <a:endParaRPr lang="en-US" altLang="ko-KR" sz="2600" dirty="0"/>
           </a:p>
         </p:txBody>
       </p:sp>
@@ -28274,6 +28280,561 @@
           </a:prstGeom>
         </p:spPr>
       </p:pic>
+      <p:sp>
+        <p:nvSpPr>
+          <p:cNvPr id="544" name="TextBox 543">
+            <a:extLst>
+              <a:ext uri="{FF2B5EF4-FFF2-40B4-BE49-F238E27FC236}">
+                <a16:creationId xmlns:a16="http://schemas.microsoft.com/office/drawing/2014/main" id="{29B7D24B-5FA5-4EA7-886B-F3FE36F3073D}"/>
+              </a:ext>
+            </a:extLst>
+          </p:cNvPr>
+          <p:cNvSpPr txBox="1"/>
+          <p:nvPr/>
+        </p:nvSpPr>
+        <p:spPr>
+          <a:xfrm>
+            <a:off x="384665" y="25984622"/>
+            <a:ext cx="14233512" cy="1323439"/>
+          </a:xfrm>
+          <a:prstGeom prst="rect">
+            <a:avLst/>
+          </a:prstGeom>
+          <a:noFill/>
+        </p:spPr>
+        <p:txBody>
+          <a:bodyPr wrap="square" rtlCol="0">
+            <a:spAutoFit/>
+          </a:bodyPr>
+          <a:lstStyle/>
+          <a:p>
+            <a:r>
+              <a:rPr lang="ko-KR" altLang="en-US" sz="4000" b="1" dirty="0">
+                <a:latin typeface="+mn-ea"/>
+              </a:rPr>
+              <a:t>곽민준</a:t>
+            </a:r>
+            <a:endParaRPr lang="en-US" altLang="ko-KR" sz="4000" b="1" dirty="0">
+              <a:latin typeface="+mn-ea"/>
+            </a:endParaRPr>
+          </a:p>
+          <a:p>
+            <a:r>
+              <a:rPr lang="en-US" altLang="ko-KR" sz="4000" b="1" dirty="0">
+                <a:latin typeface="+mn-ea"/>
+              </a:rPr>
+              <a:t>Panoramic Image Stitching</a:t>
+            </a:r>
+          </a:p>
+        </p:txBody>
+      </p:sp>
+      <p:cxnSp>
+        <p:nvCxnSpPr>
+          <p:cNvPr id="545" name="직선 연결선 544">
+            <a:extLst>
+              <a:ext uri="{FF2B5EF4-FFF2-40B4-BE49-F238E27FC236}">
+                <a16:creationId xmlns:a16="http://schemas.microsoft.com/office/drawing/2014/main" id="{B195BA05-B88F-4E47-9312-1E495B7F5D1D}"/>
+              </a:ext>
+            </a:extLst>
+          </p:cNvPr>
+          <p:cNvCxnSpPr>
+            <a:cxnSpLocks/>
+          </p:cNvCxnSpPr>
+          <p:nvPr/>
+        </p:nvCxnSpPr>
+        <p:spPr>
+          <a:xfrm>
+            <a:off x="4951550" y="27921149"/>
+            <a:ext cx="9174794" cy="13553"/>
+          </a:xfrm>
+          <a:prstGeom prst="line">
+            <a:avLst/>
+          </a:prstGeom>
+          <a:ln w="88900" cmpd="sng">
+            <a:gradFill flip="none" rotWithShape="1">
+              <a:gsLst>
+                <a:gs pos="0">
+                  <a:srgbClr val="7C001A"/>
+                </a:gs>
+                <a:gs pos="50000">
+                  <a:schemeClr val="accent2"/>
+                </a:gs>
+                <a:gs pos="100000">
+                  <a:schemeClr val="bg1"/>
+                </a:gs>
+              </a:gsLst>
+              <a:lin ang="0" scaled="1"/>
+              <a:tileRect/>
+            </a:gradFill>
+          </a:ln>
+        </p:spPr>
+        <p:style>
+          <a:lnRef idx="1">
+            <a:schemeClr val="accent1"/>
+          </a:lnRef>
+          <a:fillRef idx="0">
+            <a:schemeClr val="accent1"/>
+          </a:fillRef>
+          <a:effectRef idx="0">
+            <a:schemeClr val="accent1"/>
+          </a:effectRef>
+          <a:fontRef idx="minor">
+            <a:schemeClr val="tx1"/>
+          </a:fontRef>
+        </p:style>
+      </p:cxnSp>
+      <p:sp>
+        <p:nvSpPr>
+          <p:cNvPr id="546" name="TextBox 545">
+            <a:extLst>
+              <a:ext uri="{FF2B5EF4-FFF2-40B4-BE49-F238E27FC236}">
+                <a16:creationId xmlns:a16="http://schemas.microsoft.com/office/drawing/2014/main" id="{E7C3D194-5DFB-4CA0-91C2-9DDF0A452C08}"/>
+              </a:ext>
+            </a:extLst>
+          </p:cNvPr>
+          <p:cNvSpPr txBox="1"/>
+          <p:nvPr/>
+        </p:nvSpPr>
+        <p:spPr>
+          <a:xfrm>
+            <a:off x="384665" y="27439469"/>
+            <a:ext cx="4694054" cy="857711"/>
+          </a:xfrm>
+          <a:prstGeom prst="rect">
+            <a:avLst/>
+          </a:prstGeom>
+          <a:noFill/>
+        </p:spPr>
+        <p:txBody>
+          <a:bodyPr wrap="square" rtlCol="0">
+            <a:spAutoFit/>
+          </a:bodyPr>
+          <a:lstStyle/>
+          <a:p>
+            <a:r>
+              <a:rPr lang="en-US" altLang="ko-KR" sz="4800" dirty="0">
+                <a:latin typeface="+mn-ea"/>
+              </a:rPr>
+              <a:t>Image Stitching</a:t>
+            </a:r>
+            <a:endParaRPr lang="ko-KR" altLang="en-US" sz="4800" dirty="0">
+              <a:latin typeface="+mn-ea"/>
+            </a:endParaRPr>
+          </a:p>
+        </p:txBody>
+      </p:sp>
+      <p:sp>
+        <p:nvSpPr>
+          <p:cNvPr id="547" name="TextBox 546">
+            <a:extLst>
+              <a:ext uri="{FF2B5EF4-FFF2-40B4-BE49-F238E27FC236}">
+                <a16:creationId xmlns:a16="http://schemas.microsoft.com/office/drawing/2014/main" id="{1E4AB314-B938-4F4F-B9E6-F58A2BFD2489}"/>
+              </a:ext>
+            </a:extLst>
+          </p:cNvPr>
+          <p:cNvSpPr txBox="1"/>
+          <p:nvPr/>
+        </p:nvSpPr>
+        <p:spPr>
+          <a:xfrm>
+            <a:off x="245481" y="28714291"/>
+            <a:ext cx="14058350" cy="3615990"/>
+          </a:xfrm>
+          <a:prstGeom prst="rect">
+            <a:avLst/>
+          </a:prstGeom>
+          <a:noFill/>
+        </p:spPr>
+        <p:txBody>
+          <a:bodyPr wrap="square" rtlCol="0">
+            <a:spAutoFit/>
+          </a:bodyPr>
+          <a:lstStyle/>
+          <a:p>
+            <a:pPr marL="457200" indent="-457200">
+              <a:lnSpc>
+                <a:spcPct val="150000"/>
+              </a:lnSpc>
+              <a:buFontTx/>
+              <a:buChar char="-"/>
+            </a:pPr>
+            <a:r>
+              <a:rPr lang="en-US" altLang="ko-KR" sz="2600" dirty="0" err="1"/>
+              <a:t>Keypoint</a:t>
+            </a:r>
+            <a:r>
+              <a:rPr lang="ko-KR" altLang="en-US" sz="2600" dirty="0"/>
+              <a:t>를 </a:t>
+            </a:r>
+            <a:r>
+              <a:rPr lang="en-US" altLang="ko-KR" sz="2600" dirty="0"/>
+              <a:t>SIFT (Scale-invariant</a:t>
+            </a:r>
+            <a:r>
+              <a:rPr lang="ko-KR" altLang="en-US" sz="2600" dirty="0"/>
+              <a:t> </a:t>
+            </a:r>
+            <a:r>
+              <a:rPr lang="en-US" altLang="ko-KR" sz="2600" dirty="0"/>
+              <a:t>transform)</a:t>
+            </a:r>
+            <a:r>
+              <a:rPr lang="ko-KR" altLang="en-US" sz="2600" dirty="0"/>
+              <a:t>을 통하여 </a:t>
+            </a:r>
+            <a:r>
+              <a:rPr lang="en-US" altLang="ko-KR" sz="2600" dirty="0" err="1"/>
+              <a:t>detec</a:t>
+            </a:r>
+            <a:r>
+              <a:rPr lang="ko-KR" altLang="en-US" sz="2600" dirty="0"/>
+              <a:t>한다</a:t>
+            </a:r>
+            <a:r>
+              <a:rPr lang="en-US" altLang="ko-KR" sz="2600" dirty="0"/>
+              <a:t>.</a:t>
+            </a:r>
+          </a:p>
+          <a:p>
+            <a:pPr marL="457200" indent="-457200">
+              <a:lnSpc>
+                <a:spcPct val="150000"/>
+              </a:lnSpc>
+              <a:buFontTx/>
+              <a:buChar char="-"/>
+            </a:pPr>
+            <a:r>
+              <a:rPr lang="ko-KR" altLang="en-US" sz="2600" dirty="0"/>
+              <a:t>두 이미지의 </a:t>
+            </a:r>
+            <a:r>
+              <a:rPr lang="en-US" altLang="ko-KR" sz="2600" dirty="0" err="1"/>
+              <a:t>keypoint</a:t>
+            </a:r>
+            <a:r>
+              <a:rPr lang="ko-KR" altLang="en-US" sz="2600" dirty="0"/>
+              <a:t>를 </a:t>
+            </a:r>
+            <a:r>
+              <a:rPr lang="ko-KR" altLang="en-US" sz="2600" dirty="0" err="1"/>
+              <a:t>매칭을</a:t>
+            </a:r>
+            <a:r>
+              <a:rPr lang="ko-KR" altLang="en-US" sz="2600" dirty="0"/>
+              <a:t> 시켜본다</a:t>
+            </a:r>
+            <a:endParaRPr lang="en-US" altLang="ko-KR" sz="2600" dirty="0"/>
+          </a:p>
+          <a:p>
+            <a:pPr marL="457200" indent="-457200">
+              <a:lnSpc>
+                <a:spcPct val="150000"/>
+              </a:lnSpc>
+              <a:buFontTx/>
+              <a:buChar char="-"/>
+            </a:pPr>
+            <a:r>
+              <a:rPr lang="en-US" altLang="ko-KR" sz="2600" dirty="0"/>
+              <a:t>RANSAC (Random Sample Consensus)</a:t>
+            </a:r>
+            <a:r>
+              <a:rPr lang="ko-KR" altLang="en-US" sz="2600" dirty="0"/>
+              <a:t>를 사용하여 </a:t>
+            </a:r>
+            <a:r>
+              <a:rPr lang="en-US" altLang="ko-KR" sz="2600" dirty="0" err="1"/>
+              <a:t>Homography</a:t>
+            </a:r>
+            <a:r>
+              <a:rPr lang="en-US" altLang="ko-KR" sz="2600" dirty="0"/>
+              <a:t> Matrix</a:t>
+            </a:r>
+            <a:r>
+              <a:rPr lang="ko-KR" altLang="en-US" sz="2600" dirty="0"/>
+              <a:t>를 얻는다</a:t>
+            </a:r>
+            <a:r>
+              <a:rPr lang="en-US" altLang="ko-KR" sz="2600" dirty="0"/>
+              <a:t>.</a:t>
+            </a:r>
+          </a:p>
+          <a:p>
+            <a:pPr marL="457200" indent="-457200">
+              <a:lnSpc>
+                <a:spcPct val="150000"/>
+              </a:lnSpc>
+              <a:buFontTx/>
+              <a:buChar char="-"/>
+            </a:pPr>
+            <a:r>
+              <a:rPr lang="ko-KR" altLang="en-US" sz="2600" dirty="0"/>
+              <a:t>위 </a:t>
+            </a:r>
+            <a:r>
+              <a:rPr lang="en-US" altLang="ko-KR" sz="2600" dirty="0"/>
+              <a:t>Matrix</a:t>
+            </a:r>
+            <a:r>
+              <a:rPr lang="ko-KR" altLang="en-US" sz="2600" dirty="0"/>
+              <a:t>를 사용하여 두 이미지를 합친다</a:t>
+            </a:r>
+            <a:r>
+              <a:rPr lang="en-US" altLang="ko-KR" sz="2600" dirty="0"/>
+              <a:t>.</a:t>
+            </a:r>
+          </a:p>
+          <a:p>
+            <a:pPr marL="457200" indent="-457200">
+              <a:lnSpc>
+                <a:spcPct val="150000"/>
+              </a:lnSpc>
+              <a:buFontTx/>
+              <a:buChar char="-"/>
+            </a:pPr>
+            <a:r>
+              <a:rPr lang="ko-KR" altLang="en-US" sz="2600" dirty="0"/>
+              <a:t>두개 이상의 이미지의 경우는 위 작업을 개수 만큼 반복한다</a:t>
+            </a:r>
+            <a:r>
+              <a:rPr lang="en-US" altLang="ko-KR" sz="2600" dirty="0"/>
+              <a:t>.</a:t>
+            </a:r>
+          </a:p>
+          <a:p>
+            <a:pPr marL="457200" indent="-457200">
+              <a:lnSpc>
+                <a:spcPct val="150000"/>
+              </a:lnSpc>
+              <a:buFontTx/>
+              <a:buChar char="-"/>
+            </a:pPr>
+            <a:r>
+              <a:rPr lang="ko-KR" altLang="en-US" sz="2600" dirty="0"/>
+              <a:t>서로 스케일이 다를 경우는 해상도를 작은 쪽으로 보정을 해주고 합쳐준다</a:t>
+            </a:r>
+            <a:r>
+              <a:rPr lang="en-US" altLang="ko-KR" sz="2600" dirty="0"/>
+              <a:t>.</a:t>
+            </a:r>
+          </a:p>
+        </p:txBody>
+      </p:sp>
+      <p:sp>
+        <p:nvSpPr>
+          <p:cNvPr id="548" name="TextBox 547">
+            <a:extLst>
+              <a:ext uri="{FF2B5EF4-FFF2-40B4-BE49-F238E27FC236}">
+                <a16:creationId xmlns:a16="http://schemas.microsoft.com/office/drawing/2014/main" id="{4BF237BA-4D07-4B2C-BC17-C782E409076C}"/>
+              </a:ext>
+            </a:extLst>
+          </p:cNvPr>
+          <p:cNvSpPr txBox="1"/>
+          <p:nvPr/>
+        </p:nvSpPr>
+        <p:spPr>
+          <a:xfrm>
+            <a:off x="337113" y="32633102"/>
+            <a:ext cx="15162919" cy="776046"/>
+          </a:xfrm>
+          <a:prstGeom prst="rect">
+            <a:avLst/>
+          </a:prstGeom>
+          <a:noFill/>
+        </p:spPr>
+        <p:txBody>
+          <a:bodyPr wrap="square" rtlCol="0">
+            <a:spAutoFit/>
+          </a:bodyPr>
+          <a:lstStyle/>
+          <a:p>
+            <a:pPr>
+              <a:lnSpc>
+                <a:spcPct val="150000"/>
+              </a:lnSpc>
+            </a:pPr>
+            <a:r>
+              <a:rPr lang="en-US" altLang="ko-KR" sz="3400" dirty="0">
+                <a:latin typeface="+mn-ea"/>
+              </a:rPr>
+              <a:t>1) Images Stitching with Different</a:t>
+            </a:r>
+            <a:r>
+              <a:rPr lang="ko-KR" altLang="en-US" sz="3400" dirty="0">
+                <a:latin typeface="+mn-ea"/>
+              </a:rPr>
+              <a:t> </a:t>
+            </a:r>
+            <a:r>
+              <a:rPr lang="en-US" altLang="ko-KR" sz="3400" dirty="0">
+                <a:latin typeface="+mn-ea"/>
+              </a:rPr>
+              <a:t>Scale</a:t>
+            </a:r>
+            <a:endParaRPr lang="en-US" altLang="ko-KR" sz="3400" baseline="30000" dirty="0">
+              <a:latin typeface="+mn-ea"/>
+            </a:endParaRPr>
+          </a:p>
+        </p:txBody>
+      </p:sp>
+      <p:pic>
+        <p:nvPicPr>
+          <p:cNvPr id="3" name="그림 2" descr="물, 실외, 산, 하늘이(가) 표시된 사진&#10;&#10;자동 생성된 설명">
+            <a:extLst>
+              <a:ext uri="{FF2B5EF4-FFF2-40B4-BE49-F238E27FC236}">
+                <a16:creationId xmlns:a16="http://schemas.microsoft.com/office/drawing/2014/main" id="{A71CC8D6-CD64-4CA2-99A7-7D4E5EB8926F}"/>
+              </a:ext>
+            </a:extLst>
+          </p:cNvPr>
+          <p:cNvPicPr>
+            <a:picLocks noChangeAspect="1"/>
+          </p:cNvPicPr>
+          <p:nvPr/>
+        </p:nvPicPr>
+        <p:blipFill>
+          <a:blip r:embed="rId11">
+            <a:extLst>
+              <a:ext uri="{28A0092B-C50C-407E-A947-70E740481C1C}">
+                <a14:useLocalDpi xmlns:a14="http://schemas.microsoft.com/office/drawing/2010/main" val="0"/>
+              </a:ext>
+            </a:extLst>
+          </a:blip>
+          <a:stretch>
+            <a:fillRect/>
+          </a:stretch>
+        </p:blipFill>
+        <p:spPr>
+          <a:xfrm>
+            <a:off x="620034" y="33445518"/>
+            <a:ext cx="3025557" cy="3025557"/>
+          </a:xfrm>
+          <a:prstGeom prst="rect">
+            <a:avLst/>
+          </a:prstGeom>
+        </p:spPr>
+      </p:pic>
+      <p:pic>
+        <p:nvPicPr>
+          <p:cNvPr id="5" name="그림 4" descr="자연이(가) 표시된 사진&#10;&#10;자동 생성된 설명">
+            <a:extLst>
+              <a:ext uri="{FF2B5EF4-FFF2-40B4-BE49-F238E27FC236}">
+                <a16:creationId xmlns:a16="http://schemas.microsoft.com/office/drawing/2014/main" id="{9054C9B8-8B6E-4775-A8F7-DC695ED69145}"/>
+              </a:ext>
+            </a:extLst>
+          </p:cNvPr>
+          <p:cNvPicPr>
+            <a:picLocks noChangeAspect="1"/>
+          </p:cNvPicPr>
+          <p:nvPr/>
+        </p:nvPicPr>
+        <p:blipFill>
+          <a:blip r:embed="rId12">
+            <a:extLst>
+              <a:ext uri="{28A0092B-C50C-407E-A947-70E740481C1C}">
+                <a14:useLocalDpi xmlns:a14="http://schemas.microsoft.com/office/drawing/2010/main" val="0"/>
+              </a:ext>
+            </a:extLst>
+          </a:blip>
+          <a:stretch>
+            <a:fillRect/>
+          </a:stretch>
+        </p:blipFill>
+        <p:spPr>
+          <a:xfrm>
+            <a:off x="3902743" y="33567462"/>
+            <a:ext cx="1252419" cy="1252419"/>
+          </a:xfrm>
+          <a:prstGeom prst="rect">
+            <a:avLst/>
+          </a:prstGeom>
+        </p:spPr>
+      </p:pic>
+      <p:pic>
+        <p:nvPicPr>
+          <p:cNvPr id="7" name="그림 6" descr="물, 자연이(가) 표시된 사진&#10;&#10;자동 생성된 설명">
+            <a:extLst>
+              <a:ext uri="{FF2B5EF4-FFF2-40B4-BE49-F238E27FC236}">
+                <a16:creationId xmlns:a16="http://schemas.microsoft.com/office/drawing/2014/main" id="{446EA298-70EC-46A6-A6F4-2D79208A547A}"/>
+              </a:ext>
+            </a:extLst>
+          </p:cNvPr>
+          <p:cNvPicPr>
+            <a:picLocks noChangeAspect="1"/>
+          </p:cNvPicPr>
+          <p:nvPr/>
+        </p:nvPicPr>
+        <p:blipFill>
+          <a:blip r:embed="rId13">
+            <a:extLst>
+              <a:ext uri="{28A0092B-C50C-407E-A947-70E740481C1C}">
+                <a14:useLocalDpi xmlns:a14="http://schemas.microsoft.com/office/drawing/2010/main" val="0"/>
+              </a:ext>
+            </a:extLst>
+          </a:blip>
+          <a:stretch>
+            <a:fillRect/>
+          </a:stretch>
+        </p:blipFill>
+        <p:spPr>
+          <a:xfrm>
+            <a:off x="6604861" y="33567462"/>
+            <a:ext cx="6844159" cy="3422080"/>
+          </a:xfrm>
+          <a:prstGeom prst="rect">
+            <a:avLst/>
+          </a:prstGeom>
+        </p:spPr>
+      </p:pic>
+      <p:sp>
+        <p:nvSpPr>
+          <p:cNvPr id="555" name="TextBox 554">
+            <a:extLst>
+              <a:ext uri="{FF2B5EF4-FFF2-40B4-BE49-F238E27FC236}">
+                <a16:creationId xmlns:a16="http://schemas.microsoft.com/office/drawing/2014/main" id="{13D235A2-C414-45F3-947A-3A5F7F63789F}"/>
+              </a:ext>
+            </a:extLst>
+          </p:cNvPr>
+          <p:cNvSpPr txBox="1"/>
+          <p:nvPr/>
+        </p:nvSpPr>
+        <p:spPr>
+          <a:xfrm>
+            <a:off x="278230" y="37193674"/>
+            <a:ext cx="15162919" cy="776046"/>
+          </a:xfrm>
+          <a:prstGeom prst="rect">
+            <a:avLst/>
+          </a:prstGeom>
+          <a:noFill/>
+        </p:spPr>
+        <p:txBody>
+          <a:bodyPr wrap="square" rtlCol="0">
+            <a:spAutoFit/>
+          </a:bodyPr>
+          <a:lstStyle/>
+          <a:p>
+            <a:pPr>
+              <a:lnSpc>
+                <a:spcPct val="150000"/>
+              </a:lnSpc>
+            </a:pPr>
+            <a:r>
+              <a:rPr lang="en-US" altLang="ko-KR" sz="3400" dirty="0">
+                <a:latin typeface="+mn-ea"/>
+              </a:rPr>
+              <a:t>1) Images Stitching with </a:t>
+            </a:r>
+            <a:r>
+              <a:rPr lang="en-US" altLang="ko-KR" sz="3400">
+                <a:latin typeface="+mn-ea"/>
+              </a:rPr>
+              <a:t>Multiple Image</a:t>
+            </a:r>
+            <a:endParaRPr lang="en-US" altLang="ko-KR" sz="3400" baseline="30000" dirty="0">
+              <a:latin typeface="+mn-ea"/>
+            </a:endParaRPr>
+          </a:p>
+        </p:txBody>
+      </p:sp>
     </p:spTree>
     <p:extLst>
       <p:ext uri="{BB962C8B-B14F-4D97-AF65-F5344CB8AC3E}">

</xml_diff>